<commit_message>
added double transition err check
</commit_message>
<xml_diff>
--- a/Hourglass gif.pptx
+++ b/Hourglass gif.pptx
@@ -6,6 +6,7 @@
   </p:sldMasterIdLst>
   <p:sldIdLst>
     <p:sldId id="256" r:id="rId2"/>
+    <p:sldId id="257" r:id="rId3"/>
   </p:sldIdLst>
   <p:sldSz cx="12192000" cy="6858000"/>
   <p:notesSz cx="6858000" cy="9144000"/>
@@ -104,6 +105,11 @@
       </a:defRPr>
     </a:lvl9pPr>
   </p:defaultTextStyle>
+  <p:extLst>
+    <p:ext uri="{EFAFB233-063F-42B5-8137-9DF3F51BA10A}">
+      <p15:sldGuideLst xmlns:p15="http://schemas.microsoft.com/office/powerpoint/2012/main"/>
+    </p:ext>
+  </p:extLst>
 </p:presentation>
 </file>
 
@@ -254,7 +260,7 @@
           <a:p>
             <a:fld id="{4F6948E9-0DCE-4DEB-AA30-1E34735A0688}" type="datetimeFigureOut">
               <a:rPr lang="en-US" smtClean="0"/>
-              <a:t>5/2/2024</a:t>
+              <a:t>9/2/2024</a:t>
             </a:fld>
             <a:endParaRPr lang="en-US"/>
           </a:p>
@@ -452,7 +458,7 @@
           <a:p>
             <a:fld id="{4F6948E9-0DCE-4DEB-AA30-1E34735A0688}" type="datetimeFigureOut">
               <a:rPr lang="en-US" smtClean="0"/>
-              <a:t>5/2/2024</a:t>
+              <a:t>9/2/2024</a:t>
             </a:fld>
             <a:endParaRPr lang="en-US"/>
           </a:p>
@@ -660,7 +666,7 @@
           <a:p>
             <a:fld id="{4F6948E9-0DCE-4DEB-AA30-1E34735A0688}" type="datetimeFigureOut">
               <a:rPr lang="en-US" smtClean="0"/>
-              <a:t>5/2/2024</a:t>
+              <a:t>9/2/2024</a:t>
             </a:fld>
             <a:endParaRPr lang="en-US"/>
           </a:p>
@@ -858,7 +864,7 @@
           <a:p>
             <a:fld id="{4F6948E9-0DCE-4DEB-AA30-1E34735A0688}" type="datetimeFigureOut">
               <a:rPr lang="en-US" smtClean="0"/>
-              <a:t>5/2/2024</a:t>
+              <a:t>9/2/2024</a:t>
             </a:fld>
             <a:endParaRPr lang="en-US"/>
           </a:p>
@@ -1133,7 +1139,7 @@
           <a:p>
             <a:fld id="{4F6948E9-0DCE-4DEB-AA30-1E34735A0688}" type="datetimeFigureOut">
               <a:rPr lang="en-US" smtClean="0"/>
-              <a:t>5/2/2024</a:t>
+              <a:t>9/2/2024</a:t>
             </a:fld>
             <a:endParaRPr lang="en-US"/>
           </a:p>
@@ -1398,7 +1404,7 @@
           <a:p>
             <a:fld id="{4F6948E9-0DCE-4DEB-AA30-1E34735A0688}" type="datetimeFigureOut">
               <a:rPr lang="en-US" smtClean="0"/>
-              <a:t>5/2/2024</a:t>
+              <a:t>9/2/2024</a:t>
             </a:fld>
             <a:endParaRPr lang="en-US"/>
           </a:p>
@@ -1810,7 +1816,7 @@
           <a:p>
             <a:fld id="{4F6948E9-0DCE-4DEB-AA30-1E34735A0688}" type="datetimeFigureOut">
               <a:rPr lang="en-US" smtClean="0"/>
-              <a:t>5/2/2024</a:t>
+              <a:t>9/2/2024</a:t>
             </a:fld>
             <a:endParaRPr lang="en-US"/>
           </a:p>
@@ -1951,7 +1957,7 @@
           <a:p>
             <a:fld id="{4F6948E9-0DCE-4DEB-AA30-1E34735A0688}" type="datetimeFigureOut">
               <a:rPr lang="en-US" smtClean="0"/>
-              <a:t>5/2/2024</a:t>
+              <a:t>9/2/2024</a:t>
             </a:fld>
             <a:endParaRPr lang="en-US"/>
           </a:p>
@@ -2064,7 +2070,7 @@
           <a:p>
             <a:fld id="{4F6948E9-0DCE-4DEB-AA30-1E34735A0688}" type="datetimeFigureOut">
               <a:rPr lang="en-US" smtClean="0"/>
-              <a:t>5/2/2024</a:t>
+              <a:t>9/2/2024</a:t>
             </a:fld>
             <a:endParaRPr lang="en-US"/>
           </a:p>
@@ -2375,7 +2381,7 @@
           <a:p>
             <a:fld id="{4F6948E9-0DCE-4DEB-AA30-1E34735A0688}" type="datetimeFigureOut">
               <a:rPr lang="en-US" smtClean="0"/>
-              <a:t>5/2/2024</a:t>
+              <a:t>9/2/2024</a:t>
             </a:fld>
             <a:endParaRPr lang="en-US"/>
           </a:p>
@@ -2663,7 +2669,7 @@
           <a:p>
             <a:fld id="{4F6948E9-0DCE-4DEB-AA30-1E34735A0688}" type="datetimeFigureOut">
               <a:rPr lang="en-US" smtClean="0"/>
-              <a:t>5/2/2024</a:t>
+              <a:t>9/2/2024</a:t>
             </a:fld>
             <a:endParaRPr lang="en-US"/>
           </a:p>
@@ -2904,7 +2910,7 @@
           <a:p>
             <a:fld id="{4F6948E9-0DCE-4DEB-AA30-1E34735A0688}" type="datetimeFigureOut">
               <a:rPr lang="en-US" smtClean="0"/>
-              <a:t>5/2/2024</a:t>
+              <a:t>9/2/2024</a:t>
             </a:fld>
             <a:endParaRPr lang="en-US"/>
           </a:p>
@@ -3381,6 +3387,466 @@
 </p:sld>
 </file>
 
+<file path=ppt/slides/slide2.xml><?xml version="1.0" encoding="utf-8"?>
+<p:sld xmlns:a="http://schemas.openxmlformats.org/drawingml/2006/main" xmlns:r="http://schemas.openxmlformats.org/officeDocument/2006/relationships" xmlns:p="http://schemas.openxmlformats.org/presentationml/2006/main">
+  <p:cSld>
+    <p:spTree>
+      <p:nvGrpSpPr>
+        <p:cNvPr id="1" name=""/>
+        <p:cNvGrpSpPr/>
+        <p:nvPr/>
+      </p:nvGrpSpPr>
+      <p:grpSpPr>
+        <a:xfrm>
+          <a:off x="0" y="0"/>
+          <a:ext cx="0" cy="0"/>
+          <a:chOff x="0" y="0"/>
+          <a:chExt cx="0" cy="0"/>
+        </a:xfrm>
+      </p:grpSpPr>
+      <p:sp>
+        <p:nvSpPr>
+          <p:cNvPr id="2" name="Title 1">
+            <a:extLst>
+              <a:ext uri="{FF2B5EF4-FFF2-40B4-BE49-F238E27FC236}">
+                <a16:creationId xmlns:a16="http://schemas.microsoft.com/office/drawing/2014/main" id="{10B0EB61-6AA8-7E54-9788-FECDD5075B4C}"/>
+              </a:ext>
+            </a:extLst>
+          </p:cNvPr>
+          <p:cNvSpPr>
+            <a:spLocks noGrp="1"/>
+          </p:cNvSpPr>
+          <p:nvPr>
+            <p:ph type="title"/>
+          </p:nvPr>
+        </p:nvSpPr>
+        <p:spPr/>
+        <p:txBody>
+          <a:bodyPr/>
+          <a:lstStyle/>
+          <a:p>
+            <a:endParaRPr lang="en-US" dirty="0"/>
+          </a:p>
+        </p:txBody>
+      </p:sp>
+      <p:pic>
+        <p:nvPicPr>
+          <p:cNvPr id="5" name="Picture 4">
+            <a:extLst>
+              <a:ext uri="{FF2B5EF4-FFF2-40B4-BE49-F238E27FC236}">
+                <a16:creationId xmlns:a16="http://schemas.microsoft.com/office/drawing/2014/main" id="{E362A098-DB7C-DF33-3C67-A741B8897933}"/>
+              </a:ext>
+            </a:extLst>
+          </p:cNvPr>
+          <p:cNvPicPr>
+            <a:picLocks noChangeAspect="1"/>
+          </p:cNvPicPr>
+          <p:nvPr/>
+        </p:nvPicPr>
+        <p:blipFill>
+          <a:blip r:embed="rId2"/>
+          <a:stretch>
+            <a:fillRect/>
+          </a:stretch>
+        </p:blipFill>
+        <p:spPr>
+          <a:xfrm>
+            <a:off x="4647998" y="2338235"/>
+            <a:ext cx="2896004" cy="2181529"/>
+          </a:xfrm>
+          <a:prstGeom prst="rect">
+            <a:avLst/>
+          </a:prstGeom>
+        </p:spPr>
+      </p:pic>
+      <p:pic>
+        <p:nvPicPr>
+          <p:cNvPr id="7" name="Picture 6">
+            <a:extLst>
+              <a:ext uri="{FF2B5EF4-FFF2-40B4-BE49-F238E27FC236}">
+                <a16:creationId xmlns:a16="http://schemas.microsoft.com/office/drawing/2014/main" id="{C99621FD-C13D-530E-5D88-D0FB3D4E4D59}"/>
+              </a:ext>
+            </a:extLst>
+          </p:cNvPr>
+          <p:cNvPicPr>
+            <a:picLocks noChangeAspect="1"/>
+          </p:cNvPicPr>
+          <p:nvPr/>
+        </p:nvPicPr>
+        <p:blipFill>
+          <a:blip r:embed="rId3"/>
+          <a:stretch>
+            <a:fillRect/>
+          </a:stretch>
+        </p:blipFill>
+        <p:spPr>
+          <a:xfrm>
+            <a:off x="700869" y="2498225"/>
+            <a:ext cx="619125" cy="333375"/>
+          </a:xfrm>
+          <a:prstGeom prst="rect">
+            <a:avLst/>
+          </a:prstGeom>
+        </p:spPr>
+      </p:pic>
+      <p:pic>
+        <p:nvPicPr>
+          <p:cNvPr id="9" name="Picture 8">
+            <a:extLst>
+              <a:ext uri="{FF2B5EF4-FFF2-40B4-BE49-F238E27FC236}">
+                <a16:creationId xmlns:a16="http://schemas.microsoft.com/office/drawing/2014/main" id="{973325C1-1918-9984-09AC-04A4DD1CCBE3}"/>
+              </a:ext>
+            </a:extLst>
+          </p:cNvPr>
+          <p:cNvPicPr>
+            <a:picLocks noChangeAspect="1"/>
+          </p:cNvPicPr>
+          <p:nvPr/>
+        </p:nvPicPr>
+        <p:blipFill>
+          <a:blip r:embed="rId4"/>
+          <a:stretch>
+            <a:fillRect/>
+          </a:stretch>
+        </p:blipFill>
+        <p:spPr>
+          <a:xfrm>
+            <a:off x="1778109" y="2498225"/>
+            <a:ext cx="619125" cy="333375"/>
+          </a:xfrm>
+          <a:prstGeom prst="rect">
+            <a:avLst/>
+          </a:prstGeom>
+        </p:spPr>
+      </p:pic>
+      <p:pic>
+        <p:nvPicPr>
+          <p:cNvPr id="11" name="Picture 10">
+            <a:extLst>
+              <a:ext uri="{FF2B5EF4-FFF2-40B4-BE49-F238E27FC236}">
+                <a16:creationId xmlns:a16="http://schemas.microsoft.com/office/drawing/2014/main" id="{4B67C1D6-B4F4-6D82-A036-35DB5801CA02}"/>
+              </a:ext>
+            </a:extLst>
+          </p:cNvPr>
+          <p:cNvPicPr>
+            <a:picLocks noChangeAspect="1"/>
+          </p:cNvPicPr>
+          <p:nvPr/>
+        </p:nvPicPr>
+        <p:blipFill>
+          <a:blip r:embed="rId5"/>
+          <a:stretch>
+            <a:fillRect/>
+          </a:stretch>
+        </p:blipFill>
+        <p:spPr>
+          <a:xfrm>
+            <a:off x="1778108" y="3262311"/>
+            <a:ext cx="619125" cy="333375"/>
+          </a:xfrm>
+          <a:prstGeom prst="rect">
+            <a:avLst/>
+          </a:prstGeom>
+        </p:spPr>
+      </p:pic>
+      <p:pic>
+        <p:nvPicPr>
+          <p:cNvPr id="13" name="Picture 12">
+            <a:extLst>
+              <a:ext uri="{FF2B5EF4-FFF2-40B4-BE49-F238E27FC236}">
+                <a16:creationId xmlns:a16="http://schemas.microsoft.com/office/drawing/2014/main" id="{24DB4C38-6262-D4F7-6A0E-2E15A513BB34}"/>
+              </a:ext>
+            </a:extLst>
+          </p:cNvPr>
+          <p:cNvPicPr>
+            <a:picLocks noChangeAspect="1"/>
+          </p:cNvPicPr>
+          <p:nvPr/>
+        </p:nvPicPr>
+        <p:blipFill>
+          <a:blip r:embed="rId6"/>
+          <a:stretch>
+            <a:fillRect/>
+          </a:stretch>
+        </p:blipFill>
+        <p:spPr>
+          <a:xfrm>
+            <a:off x="1778107" y="3973159"/>
+            <a:ext cx="619125" cy="333375"/>
+          </a:xfrm>
+          <a:prstGeom prst="rect">
+            <a:avLst/>
+          </a:prstGeom>
+        </p:spPr>
+      </p:pic>
+      <p:pic>
+        <p:nvPicPr>
+          <p:cNvPr id="15" name="Picture 14">
+            <a:extLst>
+              <a:ext uri="{FF2B5EF4-FFF2-40B4-BE49-F238E27FC236}">
+                <a16:creationId xmlns:a16="http://schemas.microsoft.com/office/drawing/2014/main" id="{A58D8B72-F2D1-41C1-13C4-242ACAC90C54}"/>
+              </a:ext>
+            </a:extLst>
+          </p:cNvPr>
+          <p:cNvPicPr>
+            <a:picLocks noChangeAspect="1"/>
+          </p:cNvPicPr>
+          <p:nvPr/>
+        </p:nvPicPr>
+        <p:blipFill>
+          <a:blip r:embed="rId7"/>
+          <a:stretch>
+            <a:fillRect/>
+          </a:stretch>
+        </p:blipFill>
+        <p:spPr>
+          <a:xfrm>
+            <a:off x="700868" y="3973159"/>
+            <a:ext cx="619125" cy="333375"/>
+          </a:xfrm>
+          <a:prstGeom prst="rect">
+            <a:avLst/>
+          </a:prstGeom>
+        </p:spPr>
+      </p:pic>
+      <p:pic>
+        <p:nvPicPr>
+          <p:cNvPr id="17" name="Picture 16">
+            <a:extLst>
+              <a:ext uri="{FF2B5EF4-FFF2-40B4-BE49-F238E27FC236}">
+                <a16:creationId xmlns:a16="http://schemas.microsoft.com/office/drawing/2014/main" id="{0C3711A1-CDD5-3EA1-AE4A-C867F4A83D1B}"/>
+              </a:ext>
+            </a:extLst>
+          </p:cNvPr>
+          <p:cNvPicPr>
+            <a:picLocks noChangeAspect="1"/>
+          </p:cNvPicPr>
+          <p:nvPr/>
+        </p:nvPicPr>
+        <p:blipFill>
+          <a:blip r:embed="rId8"/>
+          <a:stretch>
+            <a:fillRect/>
+          </a:stretch>
+        </p:blipFill>
+        <p:spPr>
+          <a:xfrm>
+            <a:off x="2826119" y="3973159"/>
+            <a:ext cx="619125" cy="333375"/>
+          </a:xfrm>
+          <a:prstGeom prst="rect">
+            <a:avLst/>
+          </a:prstGeom>
+        </p:spPr>
+      </p:pic>
+      <p:pic>
+        <p:nvPicPr>
+          <p:cNvPr id="19" name="Picture 18">
+            <a:extLst>
+              <a:ext uri="{FF2B5EF4-FFF2-40B4-BE49-F238E27FC236}">
+                <a16:creationId xmlns:a16="http://schemas.microsoft.com/office/drawing/2014/main" id="{6E53FCEC-8129-478B-9ECF-EB0B72F299C6}"/>
+              </a:ext>
+            </a:extLst>
+          </p:cNvPr>
+          <p:cNvPicPr>
+            <a:picLocks noChangeAspect="1"/>
+          </p:cNvPicPr>
+          <p:nvPr/>
+        </p:nvPicPr>
+        <p:blipFill>
+          <a:blip r:embed="rId9"/>
+          <a:stretch>
+            <a:fillRect/>
+          </a:stretch>
+        </p:blipFill>
+        <p:spPr>
+          <a:xfrm>
+            <a:off x="2864284" y="3305760"/>
+            <a:ext cx="619125" cy="333375"/>
+          </a:xfrm>
+          <a:prstGeom prst="rect">
+            <a:avLst/>
+          </a:prstGeom>
+        </p:spPr>
+      </p:pic>
+      <p:pic>
+        <p:nvPicPr>
+          <p:cNvPr id="21" name="Picture 20">
+            <a:extLst>
+              <a:ext uri="{FF2B5EF4-FFF2-40B4-BE49-F238E27FC236}">
+                <a16:creationId xmlns:a16="http://schemas.microsoft.com/office/drawing/2014/main" id="{C8BBFF53-52E5-2EE9-EB5B-3BC6EB250B7D}"/>
+              </a:ext>
+            </a:extLst>
+          </p:cNvPr>
+          <p:cNvPicPr>
+            <a:picLocks noChangeAspect="1"/>
+          </p:cNvPicPr>
+          <p:nvPr/>
+        </p:nvPicPr>
+        <p:blipFill>
+          <a:blip r:embed="rId10"/>
+          <a:stretch>
+            <a:fillRect/>
+          </a:stretch>
+        </p:blipFill>
+        <p:spPr>
+          <a:xfrm>
+            <a:off x="2832508" y="2498224"/>
+            <a:ext cx="619125" cy="333375"/>
+          </a:xfrm>
+          <a:prstGeom prst="rect">
+            <a:avLst/>
+          </a:prstGeom>
+        </p:spPr>
+      </p:pic>
+      <p:pic>
+        <p:nvPicPr>
+          <p:cNvPr id="23" name="Picture 22">
+            <a:extLst>
+              <a:ext uri="{FF2B5EF4-FFF2-40B4-BE49-F238E27FC236}">
+                <a16:creationId xmlns:a16="http://schemas.microsoft.com/office/drawing/2014/main" id="{4ED021E0-4CD9-3959-9AE0-3B665E67A1EB}"/>
+              </a:ext>
+            </a:extLst>
+          </p:cNvPr>
+          <p:cNvPicPr>
+            <a:picLocks noChangeAspect="1"/>
+          </p:cNvPicPr>
+          <p:nvPr/>
+        </p:nvPicPr>
+        <p:blipFill>
+          <a:blip r:embed="rId11"/>
+          <a:stretch>
+            <a:fillRect/>
+          </a:stretch>
+        </p:blipFill>
+        <p:spPr>
+          <a:xfrm>
+            <a:off x="700868" y="3220032"/>
+            <a:ext cx="619125" cy="333375"/>
+          </a:xfrm>
+          <a:prstGeom prst="rect">
+            <a:avLst/>
+          </a:prstGeom>
+        </p:spPr>
+      </p:pic>
+      <p:sp>
+        <p:nvSpPr>
+          <p:cNvPr id="24" name="TextBox 23">
+            <a:extLst>
+              <a:ext uri="{FF2B5EF4-FFF2-40B4-BE49-F238E27FC236}">
+                <a16:creationId xmlns:a16="http://schemas.microsoft.com/office/drawing/2014/main" id="{2C988735-78DC-2490-B75A-BEDF73F5508A}"/>
+              </a:ext>
+            </a:extLst>
+          </p:cNvPr>
+          <p:cNvSpPr txBox="1"/>
+          <p:nvPr/>
+        </p:nvSpPr>
+        <p:spPr>
+          <a:xfrm>
+            <a:off x="838200" y="2016690"/>
+            <a:ext cx="2638864" cy="369332"/>
+          </a:xfrm>
+          <a:prstGeom prst="rect">
+            <a:avLst/>
+          </a:prstGeom>
+          <a:noFill/>
+        </p:spPr>
+        <p:txBody>
+          <a:bodyPr wrap="none" rtlCol="0">
+            <a:spAutoFit/>
+          </a:bodyPr>
+          <a:lstStyle/>
+          <a:p>
+            <a:r>
+              <a:rPr lang="en-US" dirty="0"/>
+              <a:t>000	001                 010</a:t>
+            </a:r>
+          </a:p>
+        </p:txBody>
+      </p:sp>
+      <p:sp>
+        <p:nvSpPr>
+          <p:cNvPr id="25" name="TextBox 24">
+            <a:extLst>
+              <a:ext uri="{FF2B5EF4-FFF2-40B4-BE49-F238E27FC236}">
+                <a16:creationId xmlns:a16="http://schemas.microsoft.com/office/drawing/2014/main" id="{308106DC-2909-8958-841B-B9883F07F7D3}"/>
+              </a:ext>
+            </a:extLst>
+          </p:cNvPr>
+          <p:cNvSpPr txBox="1"/>
+          <p:nvPr/>
+        </p:nvSpPr>
+        <p:spPr>
+          <a:xfrm>
+            <a:off x="838200" y="2882019"/>
+            <a:ext cx="2638864" cy="369332"/>
+          </a:xfrm>
+          <a:prstGeom prst="rect">
+            <a:avLst/>
+          </a:prstGeom>
+          <a:noFill/>
+        </p:spPr>
+        <p:txBody>
+          <a:bodyPr wrap="none" rtlCol="0">
+            <a:spAutoFit/>
+          </a:bodyPr>
+          <a:lstStyle/>
+          <a:p>
+            <a:r>
+              <a:rPr lang="en-US" dirty="0"/>
+              <a:t>100	101                 110</a:t>
+            </a:r>
+          </a:p>
+        </p:txBody>
+      </p:sp>
+      <p:sp>
+        <p:nvSpPr>
+          <p:cNvPr id="26" name="TextBox 25">
+            <a:extLst>
+              <a:ext uri="{FF2B5EF4-FFF2-40B4-BE49-F238E27FC236}">
+                <a16:creationId xmlns:a16="http://schemas.microsoft.com/office/drawing/2014/main" id="{7F808963-E4DA-1C92-FE02-1B25F8DB8582}"/>
+              </a:ext>
+            </a:extLst>
+          </p:cNvPr>
+          <p:cNvSpPr txBox="1"/>
+          <p:nvPr/>
+        </p:nvSpPr>
+        <p:spPr>
+          <a:xfrm>
+            <a:off x="750069" y="3665208"/>
+            <a:ext cx="2715808" cy="369332"/>
+          </a:xfrm>
+          <a:prstGeom prst="rect">
+            <a:avLst/>
+          </a:prstGeom>
+          <a:noFill/>
+        </p:spPr>
+        <p:txBody>
+          <a:bodyPr wrap="none" rtlCol="0">
+            <a:spAutoFit/>
+          </a:bodyPr>
+          <a:lstStyle/>
+          <a:p>
+            <a:r>
+              <a:rPr lang="en-US" dirty="0"/>
+              <a:t>1000	101                1010</a:t>
+            </a:r>
+          </a:p>
+        </p:txBody>
+      </p:sp>
+    </p:spTree>
+    <p:extLst>
+      <p:ext uri="{BB962C8B-B14F-4D97-AF65-F5344CB8AC3E}">
+        <p14:creationId xmlns:p14="http://schemas.microsoft.com/office/powerpoint/2010/main" val="1475311994"/>
+      </p:ext>
+    </p:extLst>
+  </p:cSld>
+  <p:clrMapOvr>
+    <a:masterClrMapping/>
+  </p:clrMapOvr>
+</p:sld>
+</file>
+
 <file path=ppt/theme/theme1.xml><?xml version="1.0" encoding="utf-8"?>
 <a:theme xmlns:a="http://schemas.openxmlformats.org/drawingml/2006/main" name="Office Theme">
   <a:themeElements>

</xml_diff>